<commit_message>
small additions to documentation
</commit_message>
<xml_diff>
--- a/documentation/Vorstellungsplakat/Muscular_Arrangement.pptx
+++ b/documentation/Vorstellungsplakat/Muscular_Arrangement.pptx
@@ -6543,8 +6543,8 @@
         </p:nvSpPr>
         <p:spPr>
           <a:xfrm>
-            <a:off x="4586400" y="6300001"/>
-            <a:ext cx="15599259" cy="1134710"/>
+            <a:off x="4586400" y="3738532"/>
+            <a:ext cx="14514027" cy="3696179"/>
           </a:xfrm>
         </p:spPr>
         <p:txBody>
@@ -6552,12 +6552,15 @@
           <a:lstStyle/>
           <a:p>
             <a:r>
-              <a:rPr lang="de-DE" dirty="0"/>
+              <a:rPr lang="de-DE" sz="5000" dirty="0"/>
               <a:t>Simulation großer Systeme – SGS</a:t>
             </a:r>
           </a:p>
           <a:p>
-            <a:endParaRPr lang="en-GB" dirty="0"/>
+            <a:r>
+              <a:rPr lang="en-GB" dirty="0"/>
+              <a:t>www.ipvs.uni-stuttgart.de</a:t>
+            </a:r>
           </a:p>
         </p:txBody>
       </p:sp>
@@ -6829,8 +6832,8 @@
         </p:nvSpPr>
         <p:spPr>
           <a:xfrm>
-            <a:off x="24357011" y="4381363"/>
-            <a:ext cx="6210996" cy="4376702"/>
+            <a:off x="19699673" y="3145740"/>
+            <a:ext cx="4729319" cy="3096004"/>
           </a:xfrm>
         </p:spPr>
         <p:txBody>
@@ -6838,34 +6841,34 @@
           <a:lstStyle/>
           <a:p>
             <a:r>
-              <a:rPr lang="en-GB" sz="4000" dirty="0"/>
+              <a:rPr lang="en-GB" sz="3200" dirty="0"/>
               <a:t>Jan Kusterer</a:t>
             </a:r>
           </a:p>
           <a:p>
             <a:r>
-              <a:rPr lang="en-GB" sz="4000" dirty="0"/>
+              <a:rPr lang="en-GB" sz="3200" dirty="0"/>
               <a:t>Niven </a:t>
             </a:r>
             <a:r>
-              <a:rPr lang="en-GB" sz="4000" dirty="0" err="1"/>
+              <a:rPr lang="en-GB" sz="3200" dirty="0" err="1"/>
               <a:t>Ratnamaheson</a:t>
             </a:r>
-            <a:endParaRPr lang="en-GB" sz="4000" dirty="0"/>
-          </a:p>
-          <a:p>
-            <a:r>
-              <a:rPr lang="en-GB" sz="4000" dirty="0" err="1"/>
+            <a:endParaRPr lang="en-GB" sz="3200" dirty="0"/>
+          </a:p>
+          <a:p>
+            <a:r>
+              <a:rPr lang="en-GB" sz="3200" dirty="0" err="1"/>
               <a:t>Raimund</a:t>
             </a:r>
             <a:r>
-              <a:rPr lang="en-GB" sz="4000" dirty="0"/>
+              <a:rPr lang="en-GB" sz="3200" dirty="0"/>
               <a:t> Rolfs</a:t>
             </a:r>
           </a:p>
           <a:p>
             <a:r>
-              <a:rPr lang="en-GB" sz="4000" dirty="0"/>
+              <a:rPr lang="en-GB" sz="3200" dirty="0"/>
               <a:t>Tobias Walter</a:t>
             </a:r>
           </a:p>
@@ -6881,14 +6884,53 @@
             <p:ph type="body" sz="quarter" idx="17"/>
           </p:nvPr>
         </p:nvSpPr>
-        <p:spPr/>
+        <p:spPr>
+          <a:xfrm>
+            <a:off x="24246824" y="3145740"/>
+            <a:ext cx="6327951" cy="5231208"/>
+          </a:xfrm>
+        </p:spPr>
         <p:txBody>
           <a:bodyPr/>
           <a:lstStyle/>
           <a:p>
             <a:r>
-              <a:rPr lang="en-GB" sz="8000" dirty="0"/>
-              <a:t>Generating and Visualizing Muscular Fascicle Arrangements</a:t>
+              <a:rPr lang="en-GB" sz="5000" b="1" dirty="0">
+                <a:solidFill>
+                  <a:schemeClr val="bg2"/>
+                </a:solidFill>
+              </a:rPr>
+              <a:t>Generating and </a:t>
+            </a:r>
+          </a:p>
+          <a:p>
+            <a:r>
+              <a:rPr lang="en-GB" sz="5000" b="1" dirty="0">
+                <a:solidFill>
+                  <a:schemeClr val="bg2"/>
+                </a:solidFill>
+              </a:rPr>
+              <a:t>Visualizing Muscular </a:t>
+            </a:r>
+          </a:p>
+          <a:p>
+            <a:r>
+              <a:rPr lang="en-GB" sz="5000" b="1" dirty="0">
+                <a:solidFill>
+                  <a:schemeClr val="bg2"/>
+                </a:solidFill>
+              </a:rPr>
+              <a:t>Fascicle </a:t>
+            </a:r>
+          </a:p>
+          <a:p>
+            <a:r>
+              <a:rPr lang="en-GB" sz="5000" b="1" dirty="0">
+                <a:solidFill>
+                  <a:schemeClr val="bg2"/>
+                </a:solidFill>
+              </a:rPr>
+              <a:t>Arrangements</a:t>
             </a:r>
           </a:p>
         </p:txBody>
@@ -6910,7 +6952,7 @@
           <a:p>
             <a:r>
               <a:rPr lang="en-GB" dirty="0"/>
-              <a:t>www.uni-Stuttgart.de</a:t>
+              <a:t>www.uni-stuttgart.de</a:t>
             </a:r>
           </a:p>
         </p:txBody>
@@ -6937,7 +6979,7 @@
         </p:blipFill>
         <p:spPr>
           <a:xfrm>
-            <a:off x="19939846" y="2703435"/>
+            <a:off x="15379511" y="3628377"/>
             <a:ext cx="3290542" cy="3290542"/>
           </a:xfrm>
           <a:prstGeom prst="rect">

</xml_diff>